<commit_message>
Updated ncgen and ncdump slides
</commit_message>
<xml_diff>
--- a/python-data/slides/02_python_text_formats.pptx
+++ b/python-data/slides/02_python_text_formats.pptx
@@ -280,7 +280,7 @@
               <a:pPr>
                 <a:defRPr/>
               </a:pPr>
-              <a:t>28/02/2023</a:t>
+              <a:t>01/03/2023</a:t>
             </a:fld>
             <a:endParaRPr lang="en-GB"/>
           </a:p>
@@ -8035,7 +8035,7 @@
               <a:pPr>
                 <a:defRPr/>
               </a:pPr>
-              <a:t>28/02/2023</a:t>
+              <a:t>01/03/2023</a:t>
             </a:fld>
             <a:endParaRPr lang="en-GB"/>
           </a:p>
@@ -18259,7 +18259,7 @@
                 <a:latin typeface="Courier New" panose="02070309020205020404" pitchFamily="49" charset="0"/>
                 <a:cs typeface="Courier New" panose="02070309020205020404" pitchFamily="49" charset="0"/>
               </a:rPr>
-              <a:t># Read the first 6 lines with the old ways...</a:t>
+              <a:t># Read the first 6 lines, as before</a:t>
             </a:r>
           </a:p>
           <a:p>
@@ -18513,6 +18513,751 @@
     <p:extLst>
       <p:ext uri="{BB962C8B-B14F-4D97-AF65-F5344CB8AC3E}">
         <p14:creationId xmlns:p14="http://schemas.microsoft.com/office/powerpoint/2010/main" val="2241143126"/>
+      </p:ext>
+    </p:extLst>
+  </p:cSld>
+  <p:clrMapOvr>
+    <a:masterClrMapping/>
+  </p:clrMapOvr>
+</p:sld>
+</file>
+
+<file path=ppt/slides/slide25.xml><?xml version="1.0" encoding="utf-8"?>
+<p:sld xmlns:a="http://schemas.openxmlformats.org/drawingml/2006/main" xmlns:r="http://schemas.openxmlformats.org/officeDocument/2006/relationships" xmlns:p="http://schemas.openxmlformats.org/presentationml/2006/main">
+  <p:cSld>
+    <p:spTree>
+      <p:nvGrpSpPr>
+        <p:cNvPr id="1" name=""/>
+        <p:cNvGrpSpPr/>
+        <p:nvPr/>
+      </p:nvGrpSpPr>
+      <p:grpSpPr>
+        <a:xfrm>
+          <a:off x="0" y="0"/>
+          <a:ext cx="0" cy="0"/>
+          <a:chOff x="0" y="0"/>
+          <a:chExt cx="0" cy="0"/>
+        </a:xfrm>
+      </p:grpSpPr>
+      <p:sp>
+        <p:nvSpPr>
+          <p:cNvPr id="52226" name="Title 1"/>
+          <p:cNvSpPr>
+            <a:spLocks noGrp="1"/>
+          </p:cNvSpPr>
+          <p:nvPr>
+            <p:ph type="title" idx="4294967295"/>
+          </p:nvPr>
+        </p:nvSpPr>
+        <p:spPr>
+          <a:xfrm>
+            <a:off x="7171" y="160940"/>
+            <a:ext cx="8229600" cy="1143000"/>
+          </a:xfrm>
+        </p:spPr>
+        <p:txBody>
+          <a:bodyPr/>
+          <a:lstStyle/>
+          <a:p>
+            <a:pPr eaLnBrk="1" hangingPunct="1"/>
+            <a:r>
+              <a:rPr lang="en-GB" altLang="en-US" b="1" dirty="0"/>
+              <a:t>Why pandas?</a:t>
+            </a:r>
+          </a:p>
+        </p:txBody>
+      </p:sp>
+      <p:sp>
+        <p:nvSpPr>
+          <p:cNvPr id="21507" name="TextBox 2"/>
+          <p:cNvSpPr txBox="1">
+            <a:spLocks noChangeArrowheads="1"/>
+          </p:cNvSpPr>
+          <p:nvPr/>
+        </p:nvSpPr>
+        <p:spPr bwMode="auto">
+          <a:xfrm>
+            <a:off x="337888" y="1094068"/>
+            <a:ext cx="8713788" cy="4093428"/>
+          </a:xfrm>
+          <a:prstGeom prst="rect">
+            <a:avLst/>
+          </a:prstGeom>
+          <a:noFill/>
+          <a:ln>
+            <a:noFill/>
+          </a:ln>
+          <a:extLst>
+            <a:ext uri="{909E8E84-426E-40DD-AFC4-6F175D3DCCD1}">
+              <a14:hiddenFill xmlns:a14="http://schemas.microsoft.com/office/drawing/2010/main">
+                <a:solidFill>
+                  <a:srgbClr val="FFFFFF"/>
+                </a:solidFill>
+              </a14:hiddenFill>
+            </a:ext>
+            <a:ext uri="{91240B29-F687-4F45-9708-019B960494DF}">
+              <a14:hiddenLine xmlns:a14="http://schemas.microsoft.com/office/drawing/2010/main" w="9525">
+                <a:solidFill>
+                  <a:srgbClr val="000000"/>
+                </a:solidFill>
+                <a:miter lim="800000"/>
+                <a:headEnd/>
+                <a:tailEnd/>
+              </a14:hiddenLine>
+            </a:ext>
+          </a:extLst>
+        </p:spPr>
+        <p:txBody>
+          <a:bodyPr>
+            <a:spAutoFit/>
+          </a:bodyPr>
+          <a:lstStyle>
+            <a:lvl1pPr>
+              <a:lnSpc>
+                <a:spcPct val="90000"/>
+              </a:lnSpc>
+              <a:spcBef>
+                <a:spcPts val="1000"/>
+              </a:spcBef>
+              <a:buFont typeface="Arial" panose="020B0604020202020204" pitchFamily="34" charset="0"/>
+              <a:buChar char="•"/>
+              <a:defRPr sz="2400">
+                <a:solidFill>
+                  <a:schemeClr val="tx1"/>
+                </a:solidFill>
+                <a:latin typeface="Calibri" panose="020F0502020204030204" pitchFamily="34" charset="0"/>
+              </a:defRPr>
+            </a:lvl1pPr>
+            <a:lvl2pPr marL="742950" indent="-285750">
+              <a:lnSpc>
+                <a:spcPct val="90000"/>
+              </a:lnSpc>
+              <a:spcBef>
+                <a:spcPts val="500"/>
+              </a:spcBef>
+              <a:buFont typeface="Arial" panose="020B0604020202020204" pitchFamily="34" charset="0"/>
+              <a:buChar char="•"/>
+              <a:defRPr sz="2000">
+                <a:solidFill>
+                  <a:schemeClr val="tx1"/>
+                </a:solidFill>
+                <a:latin typeface="Calibri" panose="020F0502020204030204" pitchFamily="34" charset="0"/>
+              </a:defRPr>
+            </a:lvl2pPr>
+            <a:lvl3pPr marL="1143000" indent="-228600">
+              <a:lnSpc>
+                <a:spcPct val="90000"/>
+              </a:lnSpc>
+              <a:spcBef>
+                <a:spcPts val="500"/>
+              </a:spcBef>
+              <a:buFont typeface="Arial" panose="020B0604020202020204" pitchFamily="34" charset="0"/>
+              <a:buChar char="•"/>
+              <a:defRPr>
+                <a:solidFill>
+                  <a:schemeClr val="tx1"/>
+                </a:solidFill>
+                <a:latin typeface="Calibri" panose="020F0502020204030204" pitchFamily="34" charset="0"/>
+              </a:defRPr>
+            </a:lvl3pPr>
+            <a:lvl4pPr marL="1600200" indent="-228600">
+              <a:lnSpc>
+                <a:spcPct val="90000"/>
+              </a:lnSpc>
+              <a:spcBef>
+                <a:spcPts val="500"/>
+              </a:spcBef>
+              <a:buFont typeface="Arial" panose="020B0604020202020204" pitchFamily="34" charset="0"/>
+              <a:buChar char="•"/>
+              <a:defRPr sz="1600">
+                <a:solidFill>
+                  <a:schemeClr val="tx1"/>
+                </a:solidFill>
+                <a:latin typeface="Calibri" panose="020F0502020204030204" pitchFamily="34" charset="0"/>
+              </a:defRPr>
+            </a:lvl4pPr>
+            <a:lvl5pPr marL="2057400" indent="-228600">
+              <a:lnSpc>
+                <a:spcPct val="90000"/>
+              </a:lnSpc>
+              <a:spcBef>
+                <a:spcPts val="500"/>
+              </a:spcBef>
+              <a:buFont typeface="Arial" panose="020B0604020202020204" pitchFamily="34" charset="0"/>
+              <a:buChar char="•"/>
+              <a:defRPr sz="1600">
+                <a:solidFill>
+                  <a:schemeClr val="tx1"/>
+                </a:solidFill>
+                <a:latin typeface="Calibri" panose="020F0502020204030204" pitchFamily="34" charset="0"/>
+              </a:defRPr>
+            </a:lvl5pPr>
+            <a:lvl6pPr marL="2514600" indent="-228600" eaLnBrk="0" fontAlgn="base" hangingPunct="0">
+              <a:lnSpc>
+                <a:spcPct val="90000"/>
+              </a:lnSpc>
+              <a:spcBef>
+                <a:spcPts val="500"/>
+              </a:spcBef>
+              <a:spcAft>
+                <a:spcPct val="0"/>
+              </a:spcAft>
+              <a:buFont typeface="Arial" panose="020B0604020202020204" pitchFamily="34" charset="0"/>
+              <a:buChar char="•"/>
+              <a:defRPr sz="1600">
+                <a:solidFill>
+                  <a:schemeClr val="tx1"/>
+                </a:solidFill>
+                <a:latin typeface="Calibri" panose="020F0502020204030204" pitchFamily="34" charset="0"/>
+              </a:defRPr>
+            </a:lvl6pPr>
+            <a:lvl7pPr marL="2971800" indent="-228600" eaLnBrk="0" fontAlgn="base" hangingPunct="0">
+              <a:lnSpc>
+                <a:spcPct val="90000"/>
+              </a:lnSpc>
+              <a:spcBef>
+                <a:spcPts val="500"/>
+              </a:spcBef>
+              <a:spcAft>
+                <a:spcPct val="0"/>
+              </a:spcAft>
+              <a:buFont typeface="Arial" panose="020B0604020202020204" pitchFamily="34" charset="0"/>
+              <a:buChar char="•"/>
+              <a:defRPr sz="1600">
+                <a:solidFill>
+                  <a:schemeClr val="tx1"/>
+                </a:solidFill>
+                <a:latin typeface="Calibri" panose="020F0502020204030204" pitchFamily="34" charset="0"/>
+              </a:defRPr>
+            </a:lvl7pPr>
+            <a:lvl8pPr marL="3429000" indent="-228600" eaLnBrk="0" fontAlgn="base" hangingPunct="0">
+              <a:lnSpc>
+                <a:spcPct val="90000"/>
+              </a:lnSpc>
+              <a:spcBef>
+                <a:spcPts val="500"/>
+              </a:spcBef>
+              <a:spcAft>
+                <a:spcPct val="0"/>
+              </a:spcAft>
+              <a:buFont typeface="Arial" panose="020B0604020202020204" pitchFamily="34" charset="0"/>
+              <a:buChar char="•"/>
+              <a:defRPr sz="1600">
+                <a:solidFill>
+                  <a:schemeClr val="tx1"/>
+                </a:solidFill>
+                <a:latin typeface="Calibri" panose="020F0502020204030204" pitchFamily="34" charset="0"/>
+              </a:defRPr>
+            </a:lvl8pPr>
+            <a:lvl9pPr marL="3886200" indent="-228600" eaLnBrk="0" fontAlgn="base" hangingPunct="0">
+              <a:lnSpc>
+                <a:spcPct val="90000"/>
+              </a:lnSpc>
+              <a:spcBef>
+                <a:spcPts val="500"/>
+              </a:spcBef>
+              <a:spcAft>
+                <a:spcPct val="0"/>
+              </a:spcAft>
+              <a:buFont typeface="Arial" panose="020B0604020202020204" pitchFamily="34" charset="0"/>
+              <a:buChar char="•"/>
+              <a:defRPr sz="1600">
+                <a:solidFill>
+                  <a:schemeClr val="tx1"/>
+                </a:solidFill>
+                <a:latin typeface="Calibri" panose="020F0502020204030204" pitchFamily="34" charset="0"/>
+              </a:defRPr>
+            </a:lvl9pPr>
+          </a:lstStyle>
+          <a:p>
+            <a:pPr eaLnBrk="1" hangingPunct="1">
+              <a:lnSpc>
+                <a:spcPct val="100000"/>
+              </a:lnSpc>
+              <a:spcBef>
+                <a:spcPct val="0"/>
+              </a:spcBef>
+              <a:buFontTx/>
+              <a:buNone/>
+              <a:defRPr/>
+            </a:pPr>
+            <a:r>
+              <a:rPr lang="en-GB" altLang="en-US" sz="2000" dirty="0">
+                <a:latin typeface="Courier New" panose="02070309020205020404" pitchFamily="49" charset="0"/>
+                <a:cs typeface="Courier New" panose="02070309020205020404" pitchFamily="49" charset="0"/>
+              </a:rPr>
+              <a:t>import pandas as pd</a:t>
+            </a:r>
+          </a:p>
+          <a:p>
+            <a:pPr eaLnBrk="1" hangingPunct="1">
+              <a:lnSpc>
+                <a:spcPct val="100000"/>
+              </a:lnSpc>
+              <a:spcBef>
+                <a:spcPct val="0"/>
+              </a:spcBef>
+              <a:buFontTx/>
+              <a:buNone/>
+              <a:defRPr/>
+            </a:pPr>
+            <a:r>
+              <a:rPr lang="en-GB" altLang="en-US" sz="2000" dirty="0" err="1">
+                <a:latin typeface="Courier New" panose="02070309020205020404" pitchFamily="49" charset="0"/>
+                <a:cs typeface="Courier New" panose="02070309020205020404" pitchFamily="49" charset="0"/>
+              </a:rPr>
+              <a:t>df</a:t>
+            </a:r>
+            <a:r>
+              <a:rPr lang="en-GB" altLang="en-US" sz="2000" dirty="0">
+                <a:latin typeface="Courier New" panose="02070309020205020404" pitchFamily="49" charset="0"/>
+                <a:cs typeface="Courier New" panose="02070309020205020404" pitchFamily="49" charset="0"/>
+              </a:rPr>
+              <a:t> = </a:t>
+            </a:r>
+            <a:r>
+              <a:rPr lang="en-GB" altLang="en-US" sz="2000" dirty="0" err="1">
+                <a:latin typeface="Courier New" panose="02070309020205020404" pitchFamily="49" charset="0"/>
+                <a:cs typeface="Courier New" panose="02070309020205020404" pitchFamily="49" charset="0"/>
+              </a:rPr>
+              <a:t>pd.read_csv</a:t>
+            </a:r>
+            <a:r>
+              <a:rPr lang="en-GB" altLang="en-US" sz="2000" dirty="0">
+                <a:latin typeface="Courier New" panose="02070309020205020404" pitchFamily="49" charset="0"/>
+                <a:cs typeface="Courier New" panose="02070309020205020404" pitchFamily="49" charset="0"/>
+              </a:rPr>
+              <a:t>(</a:t>
+            </a:r>
+            <a:r>
+              <a:rPr lang="en-GB" altLang="en-US" sz="2000" dirty="0" err="1">
+                <a:latin typeface="Courier New" panose="02070309020205020404" pitchFamily="49" charset="0"/>
+                <a:cs typeface="Courier New" panose="02070309020205020404" pitchFamily="49" charset="0"/>
+              </a:rPr>
+              <a:t>fpath</a:t>
+            </a:r>
+            <a:r>
+              <a:rPr lang="en-GB" altLang="en-US" sz="2000" dirty="0">
+                <a:latin typeface="Courier New" panose="02070309020205020404" pitchFamily="49" charset="0"/>
+                <a:cs typeface="Courier New" panose="02070309020205020404" pitchFamily="49" charset="0"/>
+              </a:rPr>
+              <a:t>, </a:t>
+            </a:r>
+            <a:r>
+              <a:rPr lang="en-GB" altLang="en-US" sz="2000" dirty="0" err="1">
+                <a:latin typeface="Courier New" panose="02070309020205020404" pitchFamily="49" charset="0"/>
+                <a:cs typeface="Courier New" panose="02070309020205020404" pitchFamily="49" charset="0"/>
+              </a:rPr>
+              <a:t>skiprows</a:t>
+            </a:r>
+            <a:r>
+              <a:rPr lang="en-GB" altLang="en-US" sz="2000" dirty="0">
+                <a:latin typeface="Courier New" panose="02070309020205020404" pitchFamily="49" charset="0"/>
+                <a:cs typeface="Courier New" panose="02070309020205020404" pitchFamily="49" charset="0"/>
+              </a:rPr>
+              <a:t>=6, </a:t>
+            </a:r>
+            <a:r>
+              <a:rPr lang="en-GB" altLang="en-US" sz="2000" dirty="0" err="1">
+                <a:latin typeface="Courier New" panose="02070309020205020404" pitchFamily="49" charset="0"/>
+                <a:cs typeface="Courier New" panose="02070309020205020404" pitchFamily="49" charset="0"/>
+              </a:rPr>
+              <a:t>sep</a:t>
+            </a:r>
+            <a:r>
+              <a:rPr lang="en-GB" altLang="en-US" sz="2000" dirty="0">
+                <a:latin typeface="Courier New" panose="02070309020205020404" pitchFamily="49" charset="0"/>
+                <a:cs typeface="Courier New" panose="02070309020205020404" pitchFamily="49" charset="0"/>
+              </a:rPr>
+              <a:t>="\s+", 	</a:t>
+            </a:r>
+            <a:r>
+              <a:rPr lang="en-GB" altLang="en-US" sz="2000" dirty="0" err="1">
+                <a:latin typeface="Courier New" panose="02070309020205020404" pitchFamily="49" charset="0"/>
+                <a:cs typeface="Courier New" panose="02070309020205020404" pitchFamily="49" charset="0"/>
+              </a:rPr>
+              <a:t>index_col</a:t>
+            </a:r>
+            <a:r>
+              <a:rPr lang="en-GB" altLang="en-US" sz="2000" dirty="0">
+                <a:latin typeface="Courier New" panose="02070309020205020404" pitchFamily="49" charset="0"/>
+                <a:cs typeface="Courier New" panose="02070309020205020404" pitchFamily="49" charset="0"/>
+              </a:rPr>
+              <a:t>=0, </a:t>
+            </a:r>
+            <a:r>
+              <a:rPr lang="en-GB" altLang="en-US" sz="2000" dirty="0" err="1">
+                <a:latin typeface="Courier New" panose="02070309020205020404" pitchFamily="49" charset="0"/>
+                <a:cs typeface="Courier New" panose="02070309020205020404" pitchFamily="49" charset="0"/>
+              </a:rPr>
+              <a:t>na_values</a:t>
+            </a:r>
+            <a:r>
+              <a:rPr lang="en-GB" altLang="en-US" sz="2000" dirty="0">
+                <a:latin typeface="Courier New" panose="02070309020205020404" pitchFamily="49" charset="0"/>
+                <a:cs typeface="Courier New" panose="02070309020205020404" pitchFamily="49" charset="0"/>
+              </a:rPr>
+              <a:t>="---")</a:t>
+            </a:r>
+          </a:p>
+          <a:p>
+            <a:pPr eaLnBrk="1" hangingPunct="1">
+              <a:lnSpc>
+                <a:spcPct val="100000"/>
+              </a:lnSpc>
+              <a:spcBef>
+                <a:spcPct val="0"/>
+              </a:spcBef>
+              <a:buFontTx/>
+              <a:buNone/>
+              <a:defRPr/>
+            </a:pPr>
+            <a:endParaRPr lang="en-GB" altLang="en-US" sz="2000" dirty="0">
+              <a:latin typeface="Courier New" panose="02070309020205020404" pitchFamily="49" charset="0"/>
+              <a:cs typeface="Courier New" panose="02070309020205020404" pitchFamily="49" charset="0"/>
+            </a:endParaRPr>
+          </a:p>
+          <a:p>
+            <a:pPr eaLnBrk="1" hangingPunct="1">
+              <a:lnSpc>
+                <a:spcPct val="100000"/>
+              </a:lnSpc>
+              <a:spcBef>
+                <a:spcPct val="0"/>
+              </a:spcBef>
+              <a:buFontTx/>
+              <a:buNone/>
+              <a:defRPr/>
+            </a:pPr>
+            <a:r>
+              <a:rPr lang="en-GB" altLang="en-US" sz="2000" dirty="0">
+                <a:latin typeface="Courier New" panose="02070309020205020404" pitchFamily="49" charset="0"/>
+                <a:cs typeface="Courier New" panose="02070309020205020404" pitchFamily="49" charset="0"/>
+              </a:rPr>
+              <a:t># </a:t>
+            </a:r>
+            <a:r>
+              <a:rPr lang="en-GB" altLang="en-US" sz="2000" dirty="0" err="1">
+                <a:latin typeface="Courier New" panose="02070309020205020404" pitchFamily="49" charset="0"/>
+                <a:cs typeface="Courier New" panose="02070309020205020404" pitchFamily="49" charset="0"/>
+              </a:rPr>
+              <a:t>DataFrames</a:t>
+            </a:r>
+            <a:r>
+              <a:rPr lang="en-GB" altLang="en-US" sz="2000" dirty="0">
+                <a:latin typeface="Courier New" panose="02070309020205020404" pitchFamily="49" charset="0"/>
+                <a:cs typeface="Courier New" panose="02070309020205020404" pitchFamily="49" charset="0"/>
+              </a:rPr>
+              <a:t> have loads of methods</a:t>
+            </a:r>
+          </a:p>
+          <a:p>
+            <a:pPr eaLnBrk="1" hangingPunct="1">
+              <a:lnSpc>
+                <a:spcPct val="100000"/>
+              </a:lnSpc>
+              <a:spcBef>
+                <a:spcPct val="0"/>
+              </a:spcBef>
+              <a:buFontTx/>
+              <a:buNone/>
+              <a:defRPr/>
+            </a:pPr>
+            <a:r>
+              <a:rPr lang="en-GB" altLang="en-US" sz="2000" dirty="0" err="1">
+                <a:latin typeface="Courier New" panose="02070309020205020404" pitchFamily="49" charset="0"/>
+                <a:cs typeface="Courier New" panose="02070309020205020404" pitchFamily="49" charset="0"/>
+              </a:rPr>
+              <a:t>df.columns.tolist</a:t>
+            </a:r>
+            <a:r>
+              <a:rPr lang="en-GB" altLang="en-US" sz="2000" dirty="0">
+                <a:latin typeface="Courier New" panose="02070309020205020404" pitchFamily="49" charset="0"/>
+                <a:cs typeface="Courier New" panose="02070309020205020404" pitchFamily="49" charset="0"/>
+              </a:rPr>
+              <a:t>()</a:t>
+            </a:r>
+          </a:p>
+          <a:p>
+            <a:pPr eaLnBrk="1" hangingPunct="1">
+              <a:lnSpc>
+                <a:spcPct val="100000"/>
+              </a:lnSpc>
+              <a:spcBef>
+                <a:spcPct val="0"/>
+              </a:spcBef>
+              <a:buFontTx/>
+              <a:buNone/>
+              <a:defRPr/>
+            </a:pPr>
+            <a:r>
+              <a:rPr lang="en-GB" altLang="en-US" sz="2000" dirty="0">
+                <a:latin typeface="Courier New" panose="02070309020205020404" pitchFamily="49" charset="0"/>
+                <a:cs typeface="Courier New" panose="02070309020205020404" pitchFamily="49" charset="0"/>
+              </a:rPr>
+              <a:t>df.index.name</a:t>
+            </a:r>
+          </a:p>
+          <a:p>
+            <a:pPr eaLnBrk="1" hangingPunct="1">
+              <a:lnSpc>
+                <a:spcPct val="100000"/>
+              </a:lnSpc>
+              <a:spcBef>
+                <a:spcPct val="0"/>
+              </a:spcBef>
+              <a:buFontTx/>
+              <a:buNone/>
+              <a:defRPr/>
+            </a:pPr>
+            <a:r>
+              <a:rPr lang="en-GB" altLang="en-US" sz="2000" dirty="0" err="1">
+                <a:latin typeface="Courier New" panose="02070309020205020404" pitchFamily="49" charset="0"/>
+                <a:cs typeface="Courier New" panose="02070309020205020404" pitchFamily="49" charset="0"/>
+              </a:rPr>
+              <a:t>df.describe</a:t>
+            </a:r>
+            <a:r>
+              <a:rPr lang="en-GB" altLang="en-US" sz="2000" dirty="0">
+                <a:latin typeface="Courier New" panose="02070309020205020404" pitchFamily="49" charset="0"/>
+                <a:cs typeface="Courier New" panose="02070309020205020404" pitchFamily="49" charset="0"/>
+              </a:rPr>
+              <a:t>()</a:t>
+            </a:r>
+          </a:p>
+          <a:p>
+            <a:pPr eaLnBrk="1" hangingPunct="1">
+              <a:lnSpc>
+                <a:spcPct val="100000"/>
+              </a:lnSpc>
+              <a:spcBef>
+                <a:spcPct val="0"/>
+              </a:spcBef>
+              <a:buFontTx/>
+              <a:buNone/>
+              <a:defRPr/>
+            </a:pPr>
+            <a:r>
+              <a:rPr lang="en-GB" altLang="en-US" sz="2000" dirty="0">
+                <a:latin typeface="Courier New" panose="02070309020205020404" pitchFamily="49" charset="0"/>
+                <a:cs typeface="Courier New" panose="02070309020205020404" pitchFamily="49" charset="0"/>
+              </a:rPr>
+              <a:t>df.info()</a:t>
+            </a:r>
+          </a:p>
+          <a:p>
+            <a:pPr eaLnBrk="1" hangingPunct="1">
+              <a:lnSpc>
+                <a:spcPct val="100000"/>
+              </a:lnSpc>
+              <a:spcBef>
+                <a:spcPct val="0"/>
+              </a:spcBef>
+              <a:buFontTx/>
+              <a:buNone/>
+              <a:defRPr/>
+            </a:pPr>
+            <a:r>
+              <a:rPr lang="en-GB" altLang="en-US" sz="2000" dirty="0" err="1">
+                <a:latin typeface="Courier New" panose="02070309020205020404" pitchFamily="49" charset="0"/>
+                <a:cs typeface="Courier New" panose="02070309020205020404" pitchFamily="49" charset="0"/>
+              </a:rPr>
+              <a:t>df.loc</a:t>
+            </a:r>
+            <a:r>
+              <a:rPr lang="en-GB" altLang="en-US" sz="2000" dirty="0">
+                <a:latin typeface="Courier New" panose="02070309020205020404" pitchFamily="49" charset="0"/>
+                <a:cs typeface="Courier New" panose="02070309020205020404" pitchFamily="49" charset="0"/>
+              </a:rPr>
+              <a:t>[1910:1915, "WIN"]</a:t>
+            </a:r>
+          </a:p>
+          <a:p>
+            <a:pPr eaLnBrk="1" hangingPunct="1">
+              <a:lnSpc>
+                <a:spcPct val="100000"/>
+              </a:lnSpc>
+              <a:spcBef>
+                <a:spcPct val="0"/>
+              </a:spcBef>
+              <a:buFontTx/>
+              <a:buNone/>
+              <a:defRPr/>
+            </a:pPr>
+            <a:r>
+              <a:rPr lang="en-GB" altLang="en-US" sz="2000" dirty="0" err="1">
+                <a:latin typeface="Courier New" panose="02070309020205020404" pitchFamily="49" charset="0"/>
+                <a:cs typeface="Courier New" panose="02070309020205020404" pitchFamily="49" charset="0"/>
+              </a:rPr>
+              <a:t>df.MAR.plot</a:t>
+            </a:r>
+            <a:r>
+              <a:rPr lang="en-GB" altLang="en-US" sz="2000" dirty="0">
+                <a:latin typeface="Courier New" panose="02070309020205020404" pitchFamily="49" charset="0"/>
+                <a:cs typeface="Courier New" panose="02070309020205020404" pitchFamily="49" charset="0"/>
+              </a:rPr>
+              <a:t>(title="Time-series of rainfall in March", </a:t>
+            </a:r>
+          </a:p>
+          <a:p>
+            <a:pPr eaLnBrk="1" hangingPunct="1">
+              <a:lnSpc>
+                <a:spcPct val="100000"/>
+              </a:lnSpc>
+              <a:spcBef>
+                <a:spcPct val="0"/>
+              </a:spcBef>
+              <a:buFontTx/>
+              <a:buNone/>
+              <a:defRPr/>
+            </a:pPr>
+            <a:r>
+              <a:rPr lang="en-GB" altLang="en-US" sz="2000" dirty="0">
+                <a:latin typeface="Courier New" panose="02070309020205020404" pitchFamily="49" charset="0"/>
+                <a:cs typeface="Courier New" panose="02070309020205020404" pitchFamily="49" charset="0"/>
+              </a:rPr>
+              <a:t>		</a:t>
+            </a:r>
+            <a:r>
+              <a:rPr lang="en-GB" altLang="en-US" sz="2000" dirty="0" err="1">
+                <a:latin typeface="Courier New" panose="02070309020205020404" pitchFamily="49" charset="0"/>
+                <a:cs typeface="Courier New" panose="02070309020205020404" pitchFamily="49" charset="0"/>
+              </a:rPr>
+              <a:t>ylabel</a:t>
+            </a:r>
+            <a:r>
+              <a:rPr lang="en-GB" altLang="en-US" sz="2000" dirty="0">
+                <a:latin typeface="Courier New" panose="02070309020205020404" pitchFamily="49" charset="0"/>
+                <a:cs typeface="Courier New" panose="02070309020205020404" pitchFamily="49" charset="0"/>
+              </a:rPr>
+              <a:t>="Rainfall (mm)")</a:t>
+            </a:r>
+          </a:p>
+          <a:p>
+            <a:pPr eaLnBrk="1" hangingPunct="1">
+              <a:lnSpc>
+                <a:spcPct val="100000"/>
+              </a:lnSpc>
+              <a:spcBef>
+                <a:spcPct val="0"/>
+              </a:spcBef>
+              <a:buFontTx/>
+              <a:buNone/>
+              <a:defRPr/>
+            </a:pPr>
+            <a:endParaRPr lang="en-GB" altLang="en-US" sz="2000" dirty="0">
+              <a:latin typeface="Courier New" panose="02070309020205020404" pitchFamily="49" charset="0"/>
+              <a:cs typeface="Courier New" panose="02070309020205020404" pitchFamily="49" charset="0"/>
+            </a:endParaRPr>
+          </a:p>
+        </p:txBody>
+      </p:sp>
+      <p:sp>
+        <p:nvSpPr>
+          <p:cNvPr id="3" name="TextBox 2">
+            <a:extLst>
+              <a:ext uri="{FF2B5EF4-FFF2-40B4-BE49-F238E27FC236}">
+                <a16:creationId xmlns:a16="http://schemas.microsoft.com/office/drawing/2014/main" id="{FBC6312C-5316-85F6-A944-2E3334FB6439}"/>
+              </a:ext>
+            </a:extLst>
+          </p:cNvPr>
+          <p:cNvSpPr txBox="1"/>
+          <p:nvPr/>
+        </p:nvSpPr>
+        <p:spPr>
+          <a:xfrm>
+            <a:off x="-291541" y="5329706"/>
+            <a:ext cx="9226813" cy="830997"/>
+          </a:xfrm>
+          <a:prstGeom prst="rect">
+            <a:avLst/>
+          </a:prstGeom>
+          <a:noFill/>
+        </p:spPr>
+        <p:txBody>
+          <a:bodyPr wrap="square">
+            <a:spAutoFit/>
+          </a:bodyPr>
+          <a:lstStyle/>
+          <a:p>
+            <a:pPr algn="ctr"/>
+            <a:r>
+              <a:rPr lang="en-GB" sz="2400" dirty="0">
+                <a:hlinkClick r:id="rId3"/>
+              </a:rPr>
+              <a:t>https://pandas.pydata.org/pandas-docs/stable/reference/api/pandas.read_csv.html</a:t>
+            </a:r>
+            <a:r>
+              <a:rPr lang="en-GB" sz="2400" dirty="0"/>
+              <a:t> </a:t>
+            </a:r>
+          </a:p>
+        </p:txBody>
+      </p:sp>
+      <p:pic>
+        <p:nvPicPr>
+          <p:cNvPr id="5" name="Picture 4">
+            <a:extLst>
+              <a:ext uri="{FF2B5EF4-FFF2-40B4-BE49-F238E27FC236}">
+                <a16:creationId xmlns:a16="http://schemas.microsoft.com/office/drawing/2014/main" id="{BBFF8799-C545-6E46-F2D2-19D801A0BA63}"/>
+              </a:ext>
+            </a:extLst>
+          </p:cNvPr>
+          <p:cNvPicPr>
+            <a:picLocks noChangeAspect="1"/>
+          </p:cNvPicPr>
+          <p:nvPr/>
+        </p:nvPicPr>
+        <p:blipFill>
+          <a:blip r:embed="rId4"/>
+          <a:stretch>
+            <a:fillRect/>
+          </a:stretch>
+        </p:blipFill>
+        <p:spPr>
+          <a:xfrm>
+            <a:off x="7157738" y="281798"/>
+            <a:ext cx="1956865" cy="830997"/>
+          </a:xfrm>
+          <a:prstGeom prst="rect">
+            <a:avLst/>
+          </a:prstGeom>
+        </p:spPr>
+      </p:pic>
+      <p:pic>
+        <p:nvPicPr>
+          <p:cNvPr id="4" name="Picture 3">
+            <a:extLst>
+              <a:ext uri="{FF2B5EF4-FFF2-40B4-BE49-F238E27FC236}">
+                <a16:creationId xmlns:a16="http://schemas.microsoft.com/office/drawing/2014/main" id="{63FDFCD7-29A6-95B9-A838-5EF695ED612C}"/>
+              </a:ext>
+            </a:extLst>
+          </p:cNvPr>
+          <p:cNvPicPr>
+            <a:picLocks noChangeAspect="1"/>
+          </p:cNvPicPr>
+          <p:nvPr/>
+        </p:nvPicPr>
+        <p:blipFill>
+          <a:blip r:embed="rId5"/>
+          <a:stretch>
+            <a:fillRect/>
+          </a:stretch>
+        </p:blipFill>
+        <p:spPr>
+          <a:xfrm>
+            <a:off x="6366437" y="2237068"/>
+            <a:ext cx="2439675" cy="1664305"/>
+          </a:xfrm>
+          <a:prstGeom prst="rect">
+            <a:avLst/>
+          </a:prstGeom>
+        </p:spPr>
+      </p:pic>
+    </p:spTree>
+    <p:extLst>
+      <p:ext uri="{BB962C8B-B14F-4D97-AF65-F5344CB8AC3E}">
+        <p14:creationId xmlns:p14="http://schemas.microsoft.com/office/powerpoint/2010/main" val="65219557"/>
       </p:ext>
     </p:extLst>
   </p:cSld>
@@ -18531,6 +19276,9 @@
                     <p:cTn id="3" fill="hold">
                       <p:stCondLst>
                         <p:cond delay="indefinite"/>
+                        <p:cond evt="onBegin" delay="0">
+                          <p:tn val="2"/>
+                        </p:cond>
                       </p:stCondLst>
                       <p:childTnLst>
                         <p:par>
@@ -18540,7 +19288,7 @@
                             </p:stCondLst>
                             <p:childTnLst>
                               <p:par>
-                                <p:cTn id="5" presetID="1" presetClass="entr" presetSubtype="0" fill="hold" nodeType="clickEffect">
+                                <p:cTn id="5" presetID="1" presetClass="entr" presetSubtype="0" fill="hold" nodeType="withEffect">
                                   <p:stCondLst>
                                     <p:cond delay="0"/>
                                   </p:stCondLst>
@@ -18604,7 +19352,7 @@
                                         <p:tgtEl>
                                           <p:spTgt spid="21507">
                                             <p:txEl>
-                                              <p:pRg st="2" end="2"/>
+                                              <p:pRg st="1" end="1"/>
                                             </p:txEl>
                                           </p:spTgt>
                                         </p:tgtEl>
@@ -18654,1075 +19402,6 @@
                                           <p:spTgt spid="21507">
                                             <p:txEl>
                                               <p:pRg st="3" end="3"/>
-                                            </p:txEl>
-                                          </p:spTgt>
-                                        </p:tgtEl>
-                                        <p:attrNameLst>
-                                          <p:attrName>style.visibility</p:attrName>
-                                        </p:attrNameLst>
-                                      </p:cBhvr>
-                                      <p:to>
-                                        <p:strVal val="visible"/>
-                                      </p:to>
-                                    </p:set>
-                                  </p:childTnLst>
-                                </p:cTn>
-                              </p:par>
-                            </p:childTnLst>
-                          </p:cTn>
-                        </p:par>
-                      </p:childTnLst>
-                    </p:cTn>
-                  </p:par>
-                  <p:par>
-                    <p:cTn id="15" fill="hold">
-                      <p:stCondLst>
-                        <p:cond delay="indefinite"/>
-                      </p:stCondLst>
-                      <p:childTnLst>
-                        <p:par>
-                          <p:cTn id="16" fill="hold">
-                            <p:stCondLst>
-                              <p:cond delay="0"/>
-                            </p:stCondLst>
-                            <p:childTnLst>
-                              <p:par>
-                                <p:cTn id="17" presetID="1" presetClass="entr" presetSubtype="0" fill="hold" nodeType="clickEffect">
-                                  <p:stCondLst>
-                                    <p:cond delay="0"/>
-                                  </p:stCondLst>
-                                  <p:childTnLst>
-                                    <p:set>
-                                      <p:cBhvr>
-                                        <p:cTn id="18" dur="1" fill="hold">
-                                          <p:stCondLst>
-                                            <p:cond delay="0"/>
-                                          </p:stCondLst>
-                                        </p:cTn>
-                                        <p:tgtEl>
-                                          <p:spTgt spid="21507">
-                                            <p:txEl>
-                                              <p:pRg st="4" end="4"/>
-                                            </p:txEl>
-                                          </p:spTgt>
-                                        </p:tgtEl>
-                                        <p:attrNameLst>
-                                          <p:attrName>style.visibility</p:attrName>
-                                        </p:attrNameLst>
-                                      </p:cBhvr>
-                                      <p:to>
-                                        <p:strVal val="visible"/>
-                                      </p:to>
-                                    </p:set>
-                                  </p:childTnLst>
-                                </p:cTn>
-                              </p:par>
-                            </p:childTnLst>
-                          </p:cTn>
-                        </p:par>
-                      </p:childTnLst>
-                    </p:cTn>
-                  </p:par>
-                  <p:par>
-                    <p:cTn id="19" fill="hold">
-                      <p:stCondLst>
-                        <p:cond delay="indefinite"/>
-                      </p:stCondLst>
-                      <p:childTnLst>
-                        <p:par>
-                          <p:cTn id="20" fill="hold">
-                            <p:stCondLst>
-                              <p:cond delay="0"/>
-                            </p:stCondLst>
-                            <p:childTnLst>
-                              <p:par>
-                                <p:cTn id="21" presetID="1" presetClass="entr" presetSubtype="0" fill="hold" nodeType="clickEffect">
-                                  <p:stCondLst>
-                                    <p:cond delay="0"/>
-                                  </p:stCondLst>
-                                  <p:childTnLst>
-                                    <p:set>
-                                      <p:cBhvr>
-                                        <p:cTn id="22" dur="1" fill="hold">
-                                          <p:stCondLst>
-                                            <p:cond delay="0"/>
-                                          </p:stCondLst>
-                                        </p:cTn>
-                                        <p:tgtEl>
-                                          <p:spTgt spid="21507">
-                                            <p:txEl>
-                                              <p:pRg st="6" end="6"/>
-                                            </p:txEl>
-                                          </p:spTgt>
-                                        </p:tgtEl>
-                                        <p:attrNameLst>
-                                          <p:attrName>style.visibility</p:attrName>
-                                        </p:attrNameLst>
-                                      </p:cBhvr>
-                                      <p:to>
-                                        <p:strVal val="visible"/>
-                                      </p:to>
-                                    </p:set>
-                                  </p:childTnLst>
-                                </p:cTn>
-                              </p:par>
-                            </p:childTnLst>
-                          </p:cTn>
-                        </p:par>
-                      </p:childTnLst>
-                    </p:cTn>
-                  </p:par>
-                  <p:par>
-                    <p:cTn id="23" fill="hold">
-                      <p:stCondLst>
-                        <p:cond delay="indefinite"/>
-                      </p:stCondLst>
-                      <p:childTnLst>
-                        <p:par>
-                          <p:cTn id="24" fill="hold">
-                            <p:stCondLst>
-                              <p:cond delay="0"/>
-                            </p:stCondLst>
-                            <p:childTnLst>
-                              <p:par>
-                                <p:cTn id="25" presetID="1" presetClass="entr" presetSubtype="0" fill="hold" nodeType="clickEffect">
-                                  <p:stCondLst>
-                                    <p:cond delay="0"/>
-                                  </p:stCondLst>
-                                  <p:childTnLst>
-                                    <p:set>
-                                      <p:cBhvr>
-                                        <p:cTn id="26" dur="1" fill="hold">
-                                          <p:stCondLst>
-                                            <p:cond delay="0"/>
-                                          </p:stCondLst>
-                                        </p:cTn>
-                                        <p:tgtEl>
-                                          <p:spTgt spid="21507">
-                                            <p:txEl>
-                                              <p:pRg st="7" end="7"/>
-                                            </p:txEl>
-                                          </p:spTgt>
-                                        </p:tgtEl>
-                                        <p:attrNameLst>
-                                          <p:attrName>style.visibility</p:attrName>
-                                        </p:attrNameLst>
-                                      </p:cBhvr>
-                                      <p:to>
-                                        <p:strVal val="visible"/>
-                                      </p:to>
-                                    </p:set>
-                                  </p:childTnLst>
-                                </p:cTn>
-                              </p:par>
-                            </p:childTnLst>
-                          </p:cTn>
-                        </p:par>
-                      </p:childTnLst>
-                    </p:cTn>
-                  </p:par>
-                </p:childTnLst>
-              </p:cTn>
-              <p:prevCondLst>
-                <p:cond evt="onPrev" delay="0">
-                  <p:tgtEl>
-                    <p:sldTgt/>
-                  </p:tgtEl>
-                </p:cond>
-              </p:prevCondLst>
-              <p:nextCondLst>
-                <p:cond evt="onNext" delay="0">
-                  <p:tgtEl>
-                    <p:sldTgt/>
-                  </p:tgtEl>
-                </p:cond>
-              </p:nextCondLst>
-            </p:seq>
-          </p:childTnLst>
-        </p:cTn>
-      </p:par>
-    </p:tnLst>
-  </p:timing>
-</p:sld>
-</file>
-
-<file path=ppt/slides/slide25.xml><?xml version="1.0" encoding="utf-8"?>
-<p:sld xmlns:a="http://schemas.openxmlformats.org/drawingml/2006/main" xmlns:r="http://schemas.openxmlformats.org/officeDocument/2006/relationships" xmlns:p="http://schemas.openxmlformats.org/presentationml/2006/main">
-  <p:cSld>
-    <p:spTree>
-      <p:nvGrpSpPr>
-        <p:cNvPr id="1" name=""/>
-        <p:cNvGrpSpPr/>
-        <p:nvPr/>
-      </p:nvGrpSpPr>
-      <p:grpSpPr>
-        <a:xfrm>
-          <a:off x="0" y="0"/>
-          <a:ext cx="0" cy="0"/>
-          <a:chOff x="0" y="0"/>
-          <a:chExt cx="0" cy="0"/>
-        </a:xfrm>
-      </p:grpSpPr>
-      <p:sp>
-        <p:nvSpPr>
-          <p:cNvPr id="52226" name="Title 1"/>
-          <p:cNvSpPr>
-            <a:spLocks noGrp="1"/>
-          </p:cNvSpPr>
-          <p:nvPr>
-            <p:ph type="title" idx="4294967295"/>
-          </p:nvPr>
-        </p:nvSpPr>
-        <p:spPr>
-          <a:xfrm>
-            <a:off x="7171" y="160940"/>
-            <a:ext cx="8229600" cy="1143000"/>
-          </a:xfrm>
-        </p:spPr>
-        <p:txBody>
-          <a:bodyPr/>
-          <a:lstStyle/>
-          <a:p>
-            <a:pPr eaLnBrk="1" hangingPunct="1"/>
-            <a:r>
-              <a:rPr lang="en-GB" altLang="en-US" b="1" dirty="0"/>
-              <a:t>But really, use “pandas” instead!</a:t>
-            </a:r>
-          </a:p>
-        </p:txBody>
-      </p:sp>
-      <p:sp>
-        <p:nvSpPr>
-          <p:cNvPr id="21507" name="TextBox 2"/>
-          <p:cNvSpPr txBox="1">
-            <a:spLocks noChangeArrowheads="1"/>
-          </p:cNvSpPr>
-          <p:nvPr/>
-        </p:nvSpPr>
-        <p:spPr bwMode="auto">
-          <a:xfrm>
-            <a:off x="337888" y="1094068"/>
-            <a:ext cx="8713788" cy="4093428"/>
-          </a:xfrm>
-          <a:prstGeom prst="rect">
-            <a:avLst/>
-          </a:prstGeom>
-          <a:noFill/>
-          <a:ln>
-            <a:noFill/>
-          </a:ln>
-          <a:extLst>
-            <a:ext uri="{909E8E84-426E-40DD-AFC4-6F175D3DCCD1}">
-              <a14:hiddenFill xmlns:a14="http://schemas.microsoft.com/office/drawing/2010/main">
-                <a:solidFill>
-                  <a:srgbClr val="FFFFFF"/>
-                </a:solidFill>
-              </a14:hiddenFill>
-            </a:ext>
-            <a:ext uri="{91240B29-F687-4F45-9708-019B960494DF}">
-              <a14:hiddenLine xmlns:a14="http://schemas.microsoft.com/office/drawing/2010/main" w="9525">
-                <a:solidFill>
-                  <a:srgbClr val="000000"/>
-                </a:solidFill>
-                <a:miter lim="800000"/>
-                <a:headEnd/>
-                <a:tailEnd/>
-              </a14:hiddenLine>
-            </a:ext>
-          </a:extLst>
-        </p:spPr>
-        <p:txBody>
-          <a:bodyPr>
-            <a:spAutoFit/>
-          </a:bodyPr>
-          <a:lstStyle>
-            <a:lvl1pPr>
-              <a:lnSpc>
-                <a:spcPct val="90000"/>
-              </a:lnSpc>
-              <a:spcBef>
-                <a:spcPts val="1000"/>
-              </a:spcBef>
-              <a:buFont typeface="Arial" panose="020B0604020202020204" pitchFamily="34" charset="0"/>
-              <a:buChar char="•"/>
-              <a:defRPr sz="2400">
-                <a:solidFill>
-                  <a:schemeClr val="tx1"/>
-                </a:solidFill>
-                <a:latin typeface="Calibri" panose="020F0502020204030204" pitchFamily="34" charset="0"/>
-              </a:defRPr>
-            </a:lvl1pPr>
-            <a:lvl2pPr marL="742950" indent="-285750">
-              <a:lnSpc>
-                <a:spcPct val="90000"/>
-              </a:lnSpc>
-              <a:spcBef>
-                <a:spcPts val="500"/>
-              </a:spcBef>
-              <a:buFont typeface="Arial" panose="020B0604020202020204" pitchFamily="34" charset="0"/>
-              <a:buChar char="•"/>
-              <a:defRPr sz="2000">
-                <a:solidFill>
-                  <a:schemeClr val="tx1"/>
-                </a:solidFill>
-                <a:latin typeface="Calibri" panose="020F0502020204030204" pitchFamily="34" charset="0"/>
-              </a:defRPr>
-            </a:lvl2pPr>
-            <a:lvl3pPr marL="1143000" indent="-228600">
-              <a:lnSpc>
-                <a:spcPct val="90000"/>
-              </a:lnSpc>
-              <a:spcBef>
-                <a:spcPts val="500"/>
-              </a:spcBef>
-              <a:buFont typeface="Arial" panose="020B0604020202020204" pitchFamily="34" charset="0"/>
-              <a:buChar char="•"/>
-              <a:defRPr>
-                <a:solidFill>
-                  <a:schemeClr val="tx1"/>
-                </a:solidFill>
-                <a:latin typeface="Calibri" panose="020F0502020204030204" pitchFamily="34" charset="0"/>
-              </a:defRPr>
-            </a:lvl3pPr>
-            <a:lvl4pPr marL="1600200" indent="-228600">
-              <a:lnSpc>
-                <a:spcPct val="90000"/>
-              </a:lnSpc>
-              <a:spcBef>
-                <a:spcPts val="500"/>
-              </a:spcBef>
-              <a:buFont typeface="Arial" panose="020B0604020202020204" pitchFamily="34" charset="0"/>
-              <a:buChar char="•"/>
-              <a:defRPr sz="1600">
-                <a:solidFill>
-                  <a:schemeClr val="tx1"/>
-                </a:solidFill>
-                <a:latin typeface="Calibri" panose="020F0502020204030204" pitchFamily="34" charset="0"/>
-              </a:defRPr>
-            </a:lvl4pPr>
-            <a:lvl5pPr marL="2057400" indent="-228600">
-              <a:lnSpc>
-                <a:spcPct val="90000"/>
-              </a:lnSpc>
-              <a:spcBef>
-                <a:spcPts val="500"/>
-              </a:spcBef>
-              <a:buFont typeface="Arial" panose="020B0604020202020204" pitchFamily="34" charset="0"/>
-              <a:buChar char="•"/>
-              <a:defRPr sz="1600">
-                <a:solidFill>
-                  <a:schemeClr val="tx1"/>
-                </a:solidFill>
-                <a:latin typeface="Calibri" panose="020F0502020204030204" pitchFamily="34" charset="0"/>
-              </a:defRPr>
-            </a:lvl5pPr>
-            <a:lvl6pPr marL="2514600" indent="-228600" eaLnBrk="0" fontAlgn="base" hangingPunct="0">
-              <a:lnSpc>
-                <a:spcPct val="90000"/>
-              </a:lnSpc>
-              <a:spcBef>
-                <a:spcPts val="500"/>
-              </a:spcBef>
-              <a:spcAft>
-                <a:spcPct val="0"/>
-              </a:spcAft>
-              <a:buFont typeface="Arial" panose="020B0604020202020204" pitchFamily="34" charset="0"/>
-              <a:buChar char="•"/>
-              <a:defRPr sz="1600">
-                <a:solidFill>
-                  <a:schemeClr val="tx1"/>
-                </a:solidFill>
-                <a:latin typeface="Calibri" panose="020F0502020204030204" pitchFamily="34" charset="0"/>
-              </a:defRPr>
-            </a:lvl6pPr>
-            <a:lvl7pPr marL="2971800" indent="-228600" eaLnBrk="0" fontAlgn="base" hangingPunct="0">
-              <a:lnSpc>
-                <a:spcPct val="90000"/>
-              </a:lnSpc>
-              <a:spcBef>
-                <a:spcPts val="500"/>
-              </a:spcBef>
-              <a:spcAft>
-                <a:spcPct val="0"/>
-              </a:spcAft>
-              <a:buFont typeface="Arial" panose="020B0604020202020204" pitchFamily="34" charset="0"/>
-              <a:buChar char="•"/>
-              <a:defRPr sz="1600">
-                <a:solidFill>
-                  <a:schemeClr val="tx1"/>
-                </a:solidFill>
-                <a:latin typeface="Calibri" panose="020F0502020204030204" pitchFamily="34" charset="0"/>
-              </a:defRPr>
-            </a:lvl7pPr>
-            <a:lvl8pPr marL="3429000" indent="-228600" eaLnBrk="0" fontAlgn="base" hangingPunct="0">
-              <a:lnSpc>
-                <a:spcPct val="90000"/>
-              </a:lnSpc>
-              <a:spcBef>
-                <a:spcPts val="500"/>
-              </a:spcBef>
-              <a:spcAft>
-                <a:spcPct val="0"/>
-              </a:spcAft>
-              <a:buFont typeface="Arial" panose="020B0604020202020204" pitchFamily="34" charset="0"/>
-              <a:buChar char="•"/>
-              <a:defRPr sz="1600">
-                <a:solidFill>
-                  <a:schemeClr val="tx1"/>
-                </a:solidFill>
-                <a:latin typeface="Calibri" panose="020F0502020204030204" pitchFamily="34" charset="0"/>
-              </a:defRPr>
-            </a:lvl8pPr>
-            <a:lvl9pPr marL="3886200" indent="-228600" eaLnBrk="0" fontAlgn="base" hangingPunct="0">
-              <a:lnSpc>
-                <a:spcPct val="90000"/>
-              </a:lnSpc>
-              <a:spcBef>
-                <a:spcPts val="500"/>
-              </a:spcBef>
-              <a:spcAft>
-                <a:spcPct val="0"/>
-              </a:spcAft>
-              <a:buFont typeface="Arial" panose="020B0604020202020204" pitchFamily="34" charset="0"/>
-              <a:buChar char="•"/>
-              <a:defRPr sz="1600">
-                <a:solidFill>
-                  <a:schemeClr val="tx1"/>
-                </a:solidFill>
-                <a:latin typeface="Calibri" panose="020F0502020204030204" pitchFamily="34" charset="0"/>
-              </a:defRPr>
-            </a:lvl9pPr>
-          </a:lstStyle>
-          <a:p>
-            <a:pPr eaLnBrk="1" hangingPunct="1">
-              <a:lnSpc>
-                <a:spcPct val="100000"/>
-              </a:lnSpc>
-              <a:spcBef>
-                <a:spcPct val="0"/>
-              </a:spcBef>
-              <a:buFontTx/>
-              <a:buNone/>
-              <a:defRPr/>
-            </a:pPr>
-            <a:r>
-              <a:rPr lang="en-GB" altLang="en-US" sz="2000" dirty="0">
-                <a:latin typeface="Courier New" panose="02070309020205020404" pitchFamily="49" charset="0"/>
-                <a:cs typeface="Courier New" panose="02070309020205020404" pitchFamily="49" charset="0"/>
-              </a:rPr>
-              <a:t>import pandas as pd</a:t>
-            </a:r>
-          </a:p>
-          <a:p>
-            <a:pPr eaLnBrk="1" hangingPunct="1">
-              <a:lnSpc>
-                <a:spcPct val="100000"/>
-              </a:lnSpc>
-              <a:spcBef>
-                <a:spcPct val="0"/>
-              </a:spcBef>
-              <a:buFontTx/>
-              <a:buNone/>
-              <a:defRPr/>
-            </a:pPr>
-            <a:r>
-              <a:rPr lang="en-GB" altLang="en-US" sz="2000" dirty="0" err="1">
-                <a:latin typeface="Courier New" panose="02070309020205020404" pitchFamily="49" charset="0"/>
-                <a:cs typeface="Courier New" panose="02070309020205020404" pitchFamily="49" charset="0"/>
-              </a:rPr>
-              <a:t>df</a:t>
-            </a:r>
-            <a:r>
-              <a:rPr lang="en-GB" altLang="en-US" sz="2000" dirty="0">
-                <a:latin typeface="Courier New" panose="02070309020205020404" pitchFamily="49" charset="0"/>
-                <a:cs typeface="Courier New" panose="02070309020205020404" pitchFamily="49" charset="0"/>
-              </a:rPr>
-              <a:t> = </a:t>
-            </a:r>
-            <a:r>
-              <a:rPr lang="en-GB" altLang="en-US" sz="2000" dirty="0" err="1">
-                <a:latin typeface="Courier New" panose="02070309020205020404" pitchFamily="49" charset="0"/>
-                <a:cs typeface="Courier New" panose="02070309020205020404" pitchFamily="49" charset="0"/>
-              </a:rPr>
-              <a:t>pd.read_csv</a:t>
-            </a:r>
-            <a:r>
-              <a:rPr lang="en-GB" altLang="en-US" sz="2000" dirty="0">
-                <a:latin typeface="Courier New" panose="02070309020205020404" pitchFamily="49" charset="0"/>
-                <a:cs typeface="Courier New" panose="02070309020205020404" pitchFamily="49" charset="0"/>
-              </a:rPr>
-              <a:t>(</a:t>
-            </a:r>
-            <a:r>
-              <a:rPr lang="en-GB" altLang="en-US" sz="2000" dirty="0" err="1">
-                <a:latin typeface="Courier New" panose="02070309020205020404" pitchFamily="49" charset="0"/>
-                <a:cs typeface="Courier New" panose="02070309020205020404" pitchFamily="49" charset="0"/>
-              </a:rPr>
-              <a:t>fpath</a:t>
-            </a:r>
-            <a:r>
-              <a:rPr lang="en-GB" altLang="en-US" sz="2000" dirty="0">
-                <a:latin typeface="Courier New" panose="02070309020205020404" pitchFamily="49" charset="0"/>
-                <a:cs typeface="Courier New" panose="02070309020205020404" pitchFamily="49" charset="0"/>
-              </a:rPr>
-              <a:t>, </a:t>
-            </a:r>
-            <a:r>
-              <a:rPr lang="en-GB" altLang="en-US" sz="2000" dirty="0" err="1">
-                <a:latin typeface="Courier New" panose="02070309020205020404" pitchFamily="49" charset="0"/>
-                <a:cs typeface="Courier New" panose="02070309020205020404" pitchFamily="49" charset="0"/>
-              </a:rPr>
-              <a:t>skiprows</a:t>
-            </a:r>
-            <a:r>
-              <a:rPr lang="en-GB" altLang="en-US" sz="2000" dirty="0">
-                <a:latin typeface="Courier New" panose="02070309020205020404" pitchFamily="49" charset="0"/>
-                <a:cs typeface="Courier New" panose="02070309020205020404" pitchFamily="49" charset="0"/>
-              </a:rPr>
-              <a:t>=6, </a:t>
-            </a:r>
-            <a:r>
-              <a:rPr lang="en-GB" altLang="en-US" sz="2000" dirty="0" err="1">
-                <a:latin typeface="Courier New" panose="02070309020205020404" pitchFamily="49" charset="0"/>
-                <a:cs typeface="Courier New" panose="02070309020205020404" pitchFamily="49" charset="0"/>
-              </a:rPr>
-              <a:t>sep</a:t>
-            </a:r>
-            <a:r>
-              <a:rPr lang="en-GB" altLang="en-US" sz="2000" dirty="0">
-                <a:latin typeface="Courier New" panose="02070309020205020404" pitchFamily="49" charset="0"/>
-                <a:cs typeface="Courier New" panose="02070309020205020404" pitchFamily="49" charset="0"/>
-              </a:rPr>
-              <a:t>="\s+", 	</a:t>
-            </a:r>
-            <a:r>
-              <a:rPr lang="en-GB" altLang="en-US" sz="2000" dirty="0" err="1">
-                <a:latin typeface="Courier New" panose="02070309020205020404" pitchFamily="49" charset="0"/>
-                <a:cs typeface="Courier New" panose="02070309020205020404" pitchFamily="49" charset="0"/>
-              </a:rPr>
-              <a:t>index_col</a:t>
-            </a:r>
-            <a:r>
-              <a:rPr lang="en-GB" altLang="en-US" sz="2000" dirty="0">
-                <a:latin typeface="Courier New" panose="02070309020205020404" pitchFamily="49" charset="0"/>
-                <a:cs typeface="Courier New" panose="02070309020205020404" pitchFamily="49" charset="0"/>
-              </a:rPr>
-              <a:t>=0, </a:t>
-            </a:r>
-            <a:r>
-              <a:rPr lang="en-GB" altLang="en-US" sz="2000" dirty="0" err="1">
-                <a:latin typeface="Courier New" panose="02070309020205020404" pitchFamily="49" charset="0"/>
-                <a:cs typeface="Courier New" panose="02070309020205020404" pitchFamily="49" charset="0"/>
-              </a:rPr>
-              <a:t>na_values</a:t>
-            </a:r>
-            <a:r>
-              <a:rPr lang="en-GB" altLang="en-US" sz="2000" dirty="0">
-                <a:latin typeface="Courier New" panose="02070309020205020404" pitchFamily="49" charset="0"/>
-                <a:cs typeface="Courier New" panose="02070309020205020404" pitchFamily="49" charset="0"/>
-              </a:rPr>
-              <a:t>="---")</a:t>
-            </a:r>
-          </a:p>
-          <a:p>
-            <a:pPr eaLnBrk="1" hangingPunct="1">
-              <a:lnSpc>
-                <a:spcPct val="100000"/>
-              </a:lnSpc>
-              <a:spcBef>
-                <a:spcPct val="0"/>
-              </a:spcBef>
-              <a:buFontTx/>
-              <a:buNone/>
-              <a:defRPr/>
-            </a:pPr>
-            <a:endParaRPr lang="en-GB" altLang="en-US" sz="2000" dirty="0">
-              <a:latin typeface="Courier New" panose="02070309020205020404" pitchFamily="49" charset="0"/>
-              <a:cs typeface="Courier New" panose="02070309020205020404" pitchFamily="49" charset="0"/>
-            </a:endParaRPr>
-          </a:p>
-          <a:p>
-            <a:pPr eaLnBrk="1" hangingPunct="1">
-              <a:lnSpc>
-                <a:spcPct val="100000"/>
-              </a:lnSpc>
-              <a:spcBef>
-                <a:spcPct val="0"/>
-              </a:spcBef>
-              <a:buFontTx/>
-              <a:buNone/>
-              <a:defRPr/>
-            </a:pPr>
-            <a:r>
-              <a:rPr lang="en-GB" altLang="en-US" sz="2000" dirty="0">
-                <a:latin typeface="Courier New" panose="02070309020205020404" pitchFamily="49" charset="0"/>
-                <a:cs typeface="Courier New" panose="02070309020205020404" pitchFamily="49" charset="0"/>
-              </a:rPr>
-              <a:t># </a:t>
-            </a:r>
-            <a:r>
-              <a:rPr lang="en-GB" altLang="en-US" sz="2000" dirty="0" err="1">
-                <a:latin typeface="Courier New" panose="02070309020205020404" pitchFamily="49" charset="0"/>
-                <a:cs typeface="Courier New" panose="02070309020205020404" pitchFamily="49" charset="0"/>
-              </a:rPr>
-              <a:t>DataFrames</a:t>
-            </a:r>
-            <a:r>
-              <a:rPr lang="en-GB" altLang="en-US" sz="2000" dirty="0">
-                <a:latin typeface="Courier New" panose="02070309020205020404" pitchFamily="49" charset="0"/>
-                <a:cs typeface="Courier New" panose="02070309020205020404" pitchFamily="49" charset="0"/>
-              </a:rPr>
-              <a:t> have loads of methods</a:t>
-            </a:r>
-          </a:p>
-          <a:p>
-            <a:pPr eaLnBrk="1" hangingPunct="1">
-              <a:lnSpc>
-                <a:spcPct val="100000"/>
-              </a:lnSpc>
-              <a:spcBef>
-                <a:spcPct val="0"/>
-              </a:spcBef>
-              <a:buFontTx/>
-              <a:buNone/>
-              <a:defRPr/>
-            </a:pPr>
-            <a:r>
-              <a:rPr lang="en-GB" altLang="en-US" sz="2000" dirty="0" err="1">
-                <a:latin typeface="Courier New" panose="02070309020205020404" pitchFamily="49" charset="0"/>
-                <a:cs typeface="Courier New" panose="02070309020205020404" pitchFamily="49" charset="0"/>
-              </a:rPr>
-              <a:t>df.columns.tolist</a:t>
-            </a:r>
-            <a:r>
-              <a:rPr lang="en-GB" altLang="en-US" sz="2000" dirty="0">
-                <a:latin typeface="Courier New" panose="02070309020205020404" pitchFamily="49" charset="0"/>
-                <a:cs typeface="Courier New" panose="02070309020205020404" pitchFamily="49" charset="0"/>
-              </a:rPr>
-              <a:t>()</a:t>
-            </a:r>
-          </a:p>
-          <a:p>
-            <a:pPr eaLnBrk="1" hangingPunct="1">
-              <a:lnSpc>
-                <a:spcPct val="100000"/>
-              </a:lnSpc>
-              <a:spcBef>
-                <a:spcPct val="0"/>
-              </a:spcBef>
-              <a:buFontTx/>
-              <a:buNone/>
-              <a:defRPr/>
-            </a:pPr>
-            <a:r>
-              <a:rPr lang="en-GB" altLang="en-US" sz="2000" dirty="0">
-                <a:latin typeface="Courier New" panose="02070309020205020404" pitchFamily="49" charset="0"/>
-                <a:cs typeface="Courier New" panose="02070309020205020404" pitchFamily="49" charset="0"/>
-              </a:rPr>
-              <a:t>df.index.name</a:t>
-            </a:r>
-          </a:p>
-          <a:p>
-            <a:pPr eaLnBrk="1" hangingPunct="1">
-              <a:lnSpc>
-                <a:spcPct val="100000"/>
-              </a:lnSpc>
-              <a:spcBef>
-                <a:spcPct val="0"/>
-              </a:spcBef>
-              <a:buFontTx/>
-              <a:buNone/>
-              <a:defRPr/>
-            </a:pPr>
-            <a:r>
-              <a:rPr lang="en-GB" altLang="en-US" sz="2000" dirty="0" err="1">
-                <a:latin typeface="Courier New" panose="02070309020205020404" pitchFamily="49" charset="0"/>
-                <a:cs typeface="Courier New" panose="02070309020205020404" pitchFamily="49" charset="0"/>
-              </a:rPr>
-              <a:t>df.describe</a:t>
-            </a:r>
-            <a:r>
-              <a:rPr lang="en-GB" altLang="en-US" sz="2000" dirty="0">
-                <a:latin typeface="Courier New" panose="02070309020205020404" pitchFamily="49" charset="0"/>
-                <a:cs typeface="Courier New" panose="02070309020205020404" pitchFamily="49" charset="0"/>
-              </a:rPr>
-              <a:t>()</a:t>
-            </a:r>
-          </a:p>
-          <a:p>
-            <a:pPr eaLnBrk="1" hangingPunct="1">
-              <a:lnSpc>
-                <a:spcPct val="100000"/>
-              </a:lnSpc>
-              <a:spcBef>
-                <a:spcPct val="0"/>
-              </a:spcBef>
-              <a:buFontTx/>
-              <a:buNone/>
-              <a:defRPr/>
-            </a:pPr>
-            <a:r>
-              <a:rPr lang="en-GB" altLang="en-US" sz="2000" dirty="0">
-                <a:latin typeface="Courier New" panose="02070309020205020404" pitchFamily="49" charset="0"/>
-                <a:cs typeface="Courier New" panose="02070309020205020404" pitchFamily="49" charset="0"/>
-              </a:rPr>
-              <a:t>df.info()</a:t>
-            </a:r>
-          </a:p>
-          <a:p>
-            <a:pPr eaLnBrk="1" hangingPunct="1">
-              <a:lnSpc>
-                <a:spcPct val="100000"/>
-              </a:lnSpc>
-              <a:spcBef>
-                <a:spcPct val="0"/>
-              </a:spcBef>
-              <a:buFontTx/>
-              <a:buNone/>
-              <a:defRPr/>
-            </a:pPr>
-            <a:r>
-              <a:rPr lang="en-GB" altLang="en-US" sz="2000" dirty="0" err="1">
-                <a:latin typeface="Courier New" panose="02070309020205020404" pitchFamily="49" charset="0"/>
-                <a:cs typeface="Courier New" panose="02070309020205020404" pitchFamily="49" charset="0"/>
-              </a:rPr>
-              <a:t>df.loc</a:t>
-            </a:r>
-            <a:r>
-              <a:rPr lang="en-GB" altLang="en-US" sz="2000" dirty="0">
-                <a:latin typeface="Courier New" panose="02070309020205020404" pitchFamily="49" charset="0"/>
-                <a:cs typeface="Courier New" panose="02070309020205020404" pitchFamily="49" charset="0"/>
-              </a:rPr>
-              <a:t>[1918, "WIN"]</a:t>
-            </a:r>
-          </a:p>
-          <a:p>
-            <a:pPr eaLnBrk="1" hangingPunct="1">
-              <a:lnSpc>
-                <a:spcPct val="100000"/>
-              </a:lnSpc>
-              <a:spcBef>
-                <a:spcPct val="0"/>
-              </a:spcBef>
-              <a:buFontTx/>
-              <a:buNone/>
-              <a:defRPr/>
-            </a:pPr>
-            <a:r>
-              <a:rPr lang="en-GB" altLang="en-US" sz="2000" dirty="0" err="1">
-                <a:latin typeface="Courier New" panose="02070309020205020404" pitchFamily="49" charset="0"/>
-                <a:cs typeface="Courier New" panose="02070309020205020404" pitchFamily="49" charset="0"/>
-              </a:rPr>
-              <a:t>df.MAR.plot</a:t>
-            </a:r>
-            <a:r>
-              <a:rPr lang="en-GB" altLang="en-US" sz="2000" dirty="0">
-                <a:latin typeface="Courier New" panose="02070309020205020404" pitchFamily="49" charset="0"/>
-                <a:cs typeface="Courier New" panose="02070309020205020404" pitchFamily="49" charset="0"/>
-              </a:rPr>
-              <a:t>(title="Time-series of rainfall in March", </a:t>
-            </a:r>
-          </a:p>
-          <a:p>
-            <a:pPr eaLnBrk="1" hangingPunct="1">
-              <a:lnSpc>
-                <a:spcPct val="100000"/>
-              </a:lnSpc>
-              <a:spcBef>
-                <a:spcPct val="0"/>
-              </a:spcBef>
-              <a:buFontTx/>
-              <a:buNone/>
-              <a:defRPr/>
-            </a:pPr>
-            <a:r>
-              <a:rPr lang="en-GB" altLang="en-US" sz="2000" dirty="0">
-                <a:latin typeface="Courier New" panose="02070309020205020404" pitchFamily="49" charset="0"/>
-                <a:cs typeface="Courier New" panose="02070309020205020404" pitchFamily="49" charset="0"/>
-              </a:rPr>
-              <a:t>		</a:t>
-            </a:r>
-            <a:r>
-              <a:rPr lang="en-GB" altLang="en-US" sz="2000" dirty="0" err="1">
-                <a:latin typeface="Courier New" panose="02070309020205020404" pitchFamily="49" charset="0"/>
-                <a:cs typeface="Courier New" panose="02070309020205020404" pitchFamily="49" charset="0"/>
-              </a:rPr>
-              <a:t>ylabel</a:t>
-            </a:r>
-            <a:r>
-              <a:rPr lang="en-GB" altLang="en-US" sz="2000" dirty="0">
-                <a:latin typeface="Courier New" panose="02070309020205020404" pitchFamily="49" charset="0"/>
-                <a:cs typeface="Courier New" panose="02070309020205020404" pitchFamily="49" charset="0"/>
-              </a:rPr>
-              <a:t>="Rainfall (mm)")</a:t>
-            </a:r>
-          </a:p>
-          <a:p>
-            <a:pPr eaLnBrk="1" hangingPunct="1">
-              <a:lnSpc>
-                <a:spcPct val="100000"/>
-              </a:lnSpc>
-              <a:spcBef>
-                <a:spcPct val="0"/>
-              </a:spcBef>
-              <a:buFontTx/>
-              <a:buNone/>
-              <a:defRPr/>
-            </a:pPr>
-            <a:endParaRPr lang="en-GB" altLang="en-US" sz="2000" dirty="0">
-              <a:latin typeface="Courier New" panose="02070309020205020404" pitchFamily="49" charset="0"/>
-              <a:cs typeface="Courier New" panose="02070309020205020404" pitchFamily="49" charset="0"/>
-            </a:endParaRPr>
-          </a:p>
-        </p:txBody>
-      </p:sp>
-      <p:sp>
-        <p:nvSpPr>
-          <p:cNvPr id="3" name="TextBox 2">
-            <a:extLst>
-              <a:ext uri="{FF2B5EF4-FFF2-40B4-BE49-F238E27FC236}">
-                <a16:creationId xmlns:a16="http://schemas.microsoft.com/office/drawing/2014/main" id="{FBC6312C-5316-85F6-A944-2E3334FB6439}"/>
-              </a:ext>
-            </a:extLst>
-          </p:cNvPr>
-          <p:cNvSpPr txBox="1"/>
-          <p:nvPr/>
-        </p:nvSpPr>
-        <p:spPr>
-          <a:xfrm>
-            <a:off x="-291541" y="5329706"/>
-            <a:ext cx="9226813" cy="830997"/>
-          </a:xfrm>
-          <a:prstGeom prst="rect">
-            <a:avLst/>
-          </a:prstGeom>
-          <a:noFill/>
-        </p:spPr>
-        <p:txBody>
-          <a:bodyPr wrap="square">
-            <a:spAutoFit/>
-          </a:bodyPr>
-          <a:lstStyle/>
-          <a:p>
-            <a:pPr algn="ctr"/>
-            <a:r>
-              <a:rPr lang="en-GB" sz="2400" dirty="0">
-                <a:hlinkClick r:id="rId3"/>
-              </a:rPr>
-              <a:t>https://pandas.pydata.org/pandas-docs/stable/reference/api/pandas.read_csv.html</a:t>
-            </a:r>
-            <a:r>
-              <a:rPr lang="en-GB" sz="2400" dirty="0"/>
-              <a:t> </a:t>
-            </a:r>
-          </a:p>
-        </p:txBody>
-      </p:sp>
-      <p:pic>
-        <p:nvPicPr>
-          <p:cNvPr id="5" name="Picture 4">
-            <a:extLst>
-              <a:ext uri="{FF2B5EF4-FFF2-40B4-BE49-F238E27FC236}">
-                <a16:creationId xmlns:a16="http://schemas.microsoft.com/office/drawing/2014/main" id="{BBFF8799-C545-6E46-F2D2-19D801A0BA63}"/>
-              </a:ext>
-            </a:extLst>
-          </p:cNvPr>
-          <p:cNvPicPr>
-            <a:picLocks noChangeAspect="1"/>
-          </p:cNvPicPr>
-          <p:nvPr/>
-        </p:nvPicPr>
-        <p:blipFill>
-          <a:blip r:embed="rId4"/>
-          <a:stretch>
-            <a:fillRect/>
-          </a:stretch>
-        </p:blipFill>
-        <p:spPr>
-          <a:xfrm>
-            <a:off x="7163087" y="711728"/>
-            <a:ext cx="1956865" cy="830997"/>
-          </a:xfrm>
-          <a:prstGeom prst="rect">
-            <a:avLst/>
-          </a:prstGeom>
-        </p:spPr>
-      </p:pic>
-      <p:pic>
-        <p:nvPicPr>
-          <p:cNvPr id="4" name="Picture 3">
-            <a:extLst>
-              <a:ext uri="{FF2B5EF4-FFF2-40B4-BE49-F238E27FC236}">
-                <a16:creationId xmlns:a16="http://schemas.microsoft.com/office/drawing/2014/main" id="{63FDFCD7-29A6-95B9-A838-5EF695ED612C}"/>
-              </a:ext>
-            </a:extLst>
-          </p:cNvPr>
-          <p:cNvPicPr>
-            <a:picLocks noChangeAspect="1"/>
-          </p:cNvPicPr>
-          <p:nvPr/>
-        </p:nvPicPr>
-        <p:blipFill>
-          <a:blip r:embed="rId5"/>
-          <a:stretch>
-            <a:fillRect/>
-          </a:stretch>
-        </p:blipFill>
-        <p:spPr>
-          <a:xfrm>
-            <a:off x="6366437" y="2237068"/>
-            <a:ext cx="2439675" cy="1664305"/>
-          </a:xfrm>
-          <a:prstGeom prst="rect">
-            <a:avLst/>
-          </a:prstGeom>
-        </p:spPr>
-      </p:pic>
-    </p:spTree>
-    <p:extLst>
-      <p:ext uri="{BB962C8B-B14F-4D97-AF65-F5344CB8AC3E}">
-        <p14:creationId xmlns:p14="http://schemas.microsoft.com/office/powerpoint/2010/main" val="65219557"/>
-      </p:ext>
-    </p:extLst>
-  </p:cSld>
-  <p:clrMapOvr>
-    <a:masterClrMapping/>
-  </p:clrMapOvr>
-  <p:timing>
-    <p:tnLst>
-      <p:par>
-        <p:cTn id="1" dur="indefinite" restart="never" nodeType="tmRoot">
-          <p:childTnLst>
-            <p:seq concurrent="1" nextAc="seek">
-              <p:cTn id="2" dur="indefinite" nodeType="mainSeq">
-                <p:childTnLst>
-                  <p:par>
-                    <p:cTn id="3" fill="hold">
-                      <p:stCondLst>
-                        <p:cond delay="indefinite"/>
-                      </p:stCondLst>
-                      <p:childTnLst>
-                        <p:par>
-                          <p:cTn id="4" fill="hold">
-                            <p:stCondLst>
-                              <p:cond delay="0"/>
-                            </p:stCondLst>
-                            <p:childTnLst>
-                              <p:par>
-                                <p:cTn id="5" presetID="1" presetClass="entr" presetSubtype="0" fill="hold" nodeType="clickEffect">
-                                  <p:stCondLst>
-                                    <p:cond delay="0"/>
-                                  </p:stCondLst>
-                                  <p:childTnLst>
-                                    <p:set>
-                                      <p:cBhvr>
-                                        <p:cTn id="6" dur="1" fill="hold">
-                                          <p:stCondLst>
-                                            <p:cond delay="0"/>
-                                          </p:stCondLst>
-                                        </p:cTn>
-                                        <p:tgtEl>
-                                          <p:spTgt spid="21507">
-                                            <p:txEl>
-                                              <p:pRg st="1" end="1"/>
-                                            </p:txEl>
-                                          </p:spTgt>
-                                        </p:tgtEl>
-                                        <p:attrNameLst>
-                                          <p:attrName>style.visibility</p:attrName>
-                                        </p:attrNameLst>
-                                      </p:cBhvr>
-                                      <p:to>
-                                        <p:strVal val="visible"/>
-                                      </p:to>
-                                    </p:set>
-                                  </p:childTnLst>
-                                </p:cTn>
-                              </p:par>
-                            </p:childTnLst>
-                          </p:cTn>
-                        </p:par>
-                      </p:childTnLst>
-                    </p:cTn>
-                  </p:par>
-                  <p:par>
-                    <p:cTn id="7" fill="hold">
-                      <p:stCondLst>
-                        <p:cond delay="indefinite"/>
-                      </p:stCondLst>
-                      <p:childTnLst>
-                        <p:par>
-                          <p:cTn id="8" fill="hold">
-                            <p:stCondLst>
-                              <p:cond delay="0"/>
-                            </p:stCondLst>
-                            <p:childTnLst>
-                              <p:par>
-                                <p:cTn id="9" presetID="1" presetClass="entr" presetSubtype="0" fill="hold" nodeType="clickEffect">
-                                  <p:stCondLst>
-                                    <p:cond delay="0"/>
-                                  </p:stCondLst>
-                                  <p:childTnLst>
-                                    <p:set>
-                                      <p:cBhvr>
-                                        <p:cTn id="10" dur="1" fill="hold">
-                                          <p:stCondLst>
-                                            <p:cond delay="0"/>
-                                          </p:stCondLst>
-                                        </p:cTn>
-                                        <p:tgtEl>
-                                          <p:spTgt spid="21507">
-                                            <p:txEl>
-                                              <p:pRg st="3" end="3"/>
-                                            </p:txEl>
-                                          </p:spTgt>
-                                        </p:tgtEl>
-                                        <p:attrNameLst>
-                                          <p:attrName>style.visibility</p:attrName>
-                                        </p:attrNameLst>
-                                      </p:cBhvr>
-                                      <p:to>
-                                        <p:strVal val="visible"/>
-                                      </p:to>
-                                    </p:set>
-                                  </p:childTnLst>
-                                </p:cTn>
-                              </p:par>
-                            </p:childTnLst>
-                          </p:cTn>
-                        </p:par>
-                      </p:childTnLst>
-                    </p:cTn>
-                  </p:par>
-                  <p:par>
-                    <p:cTn id="11" fill="hold">
-                      <p:stCondLst>
-                        <p:cond delay="indefinite"/>
-                      </p:stCondLst>
-                      <p:childTnLst>
-                        <p:par>
-                          <p:cTn id="12" fill="hold">
-                            <p:stCondLst>
-                              <p:cond delay="0"/>
-                            </p:stCondLst>
-                            <p:childTnLst>
-                              <p:par>
-                                <p:cTn id="13" presetID="1" presetClass="entr" presetSubtype="0" fill="hold" nodeType="clickEffect">
-                                  <p:stCondLst>
-                                    <p:cond delay="0"/>
-                                  </p:stCondLst>
-                                  <p:childTnLst>
-                                    <p:set>
-                                      <p:cBhvr>
-                                        <p:cTn id="14" dur="1" fill="hold">
-                                          <p:stCondLst>
-                                            <p:cond delay="0"/>
-                                          </p:stCondLst>
-                                        </p:cTn>
-                                        <p:tgtEl>
-                                          <p:spTgt spid="21507">
-                                            <p:txEl>
-                                              <p:pRg st="0" end="0"/>
                                             </p:txEl>
                                           </p:spTgt>
                                         </p:tgtEl>
@@ -20086,6 +19765,96 @@
                       </p:childTnLst>
                     </p:cTn>
                   </p:par>
+                  <p:par>
+                    <p:cTn id="43" fill="hold">
+                      <p:stCondLst>
+                        <p:cond delay="indefinite"/>
+                      </p:stCondLst>
+                      <p:childTnLst>
+                        <p:par>
+                          <p:cTn id="44" fill="hold">
+                            <p:stCondLst>
+                              <p:cond delay="0"/>
+                            </p:stCondLst>
+                            <p:childTnLst>
+                              <p:par>
+                                <p:cTn id="45" presetID="1" presetClass="entr" presetSubtype="0" fill="hold" nodeType="clickEffect">
+                                  <p:stCondLst>
+                                    <p:cond delay="0"/>
+                                  </p:stCondLst>
+                                  <p:childTnLst>
+                                    <p:set>
+                                      <p:cBhvr>
+                                        <p:cTn id="46" dur="1" fill="hold">
+                                          <p:stCondLst>
+                                            <p:cond delay="0"/>
+                                          </p:stCondLst>
+                                        </p:cTn>
+                                        <p:tgtEl>
+                                          <p:spTgt spid="4"/>
+                                        </p:tgtEl>
+                                        <p:attrNameLst>
+                                          <p:attrName>style.visibility</p:attrName>
+                                        </p:attrNameLst>
+                                      </p:cBhvr>
+                                      <p:to>
+                                        <p:strVal val="visible"/>
+                                      </p:to>
+                                    </p:set>
+                                  </p:childTnLst>
+                                </p:cTn>
+                              </p:par>
+                            </p:childTnLst>
+                          </p:cTn>
+                        </p:par>
+                      </p:childTnLst>
+                    </p:cTn>
+                  </p:par>
+                  <p:par>
+                    <p:cTn id="47" fill="hold">
+                      <p:stCondLst>
+                        <p:cond delay="indefinite"/>
+                      </p:stCondLst>
+                      <p:childTnLst>
+                        <p:par>
+                          <p:cTn id="48" fill="hold">
+                            <p:stCondLst>
+                              <p:cond delay="0"/>
+                            </p:stCondLst>
+                            <p:childTnLst>
+                              <p:par>
+                                <p:cTn id="49" presetID="1" presetClass="entr" presetSubtype="0" fill="hold" grpId="0" nodeType="clickEffect">
+                                  <p:stCondLst>
+                                    <p:cond delay="0"/>
+                                  </p:stCondLst>
+                                  <p:childTnLst>
+                                    <p:set>
+                                      <p:cBhvr>
+                                        <p:cTn id="50" dur="1" fill="hold">
+                                          <p:stCondLst>
+                                            <p:cond delay="0"/>
+                                          </p:stCondLst>
+                                        </p:cTn>
+                                        <p:tgtEl>
+                                          <p:spTgt spid="3"/>
+                                        </p:tgtEl>
+                                        <p:attrNameLst>
+                                          <p:attrName>style.visibility</p:attrName>
+                                        </p:attrNameLst>
+                                      </p:cBhvr>
+                                      <p:to>
+                                        <p:strVal val="visible"/>
+                                      </p:to>
+                                    </p:set>
+                                  </p:childTnLst>
+                                </p:cTn>
+                              </p:par>
+                            </p:childTnLst>
+                          </p:cTn>
+                        </p:par>
+                      </p:childTnLst>
+                    </p:cTn>
+                  </p:par>
                 </p:childTnLst>
               </p:cTn>
               <p:prevCondLst>
@@ -20107,6 +19876,9 @@
         </p:cTn>
       </p:par>
     </p:tnLst>
+    <p:bldLst>
+      <p:bldP spid="3" grpId="0"/>
+    </p:bldLst>
   </p:timing>
 </p:sld>
 </file>

</xml_diff>